<commit_message>
Add coding service page
</commit_message>
<xml_diff>
--- a/figures.pptx
+++ b/figures.pptx
@@ -8,6 +8,7 @@
     <p:sldId id="256" r:id="rId2"/>
     <p:sldId id="257" r:id="rId3"/>
     <p:sldId id="258" r:id="rId4"/>
+    <p:sldId id="259" r:id="rId5"/>
   </p:sldIdLst>
   <p:sldSz cx="6858000" cy="9144000" type="screen4x3"/>
   <p:notesSz cx="6858000" cy="9144000"/>
@@ -5581,6 +5582,1393 @@
 </p:sld>
 </file>
 
+<file path=ppt/slides/slide4.xml><?xml version="1.0" encoding="utf-8"?>
+<p:sld xmlns:a="http://schemas.openxmlformats.org/drawingml/2006/main" xmlns:r="http://schemas.openxmlformats.org/officeDocument/2006/relationships" xmlns:p="http://schemas.openxmlformats.org/presentationml/2006/main">
+  <p:cSld>
+    <p:spTree>
+      <p:nvGrpSpPr>
+        <p:cNvPr id="1" name=""/>
+        <p:cNvGrpSpPr/>
+        <p:nvPr/>
+      </p:nvGrpSpPr>
+      <p:grpSpPr>
+        <a:xfrm>
+          <a:off x="0" y="0"/>
+          <a:ext cx="0" cy="0"/>
+          <a:chOff x="0" y="0"/>
+          <a:chExt cx="0" cy="0"/>
+        </a:xfrm>
+      </p:grpSpPr>
+      <p:sp>
+        <p:nvSpPr>
+          <p:cNvPr id="32" name="Rechteck 31">
+            <a:extLst>
+              <a:ext uri="{FF2B5EF4-FFF2-40B4-BE49-F238E27FC236}">
+                <a16:creationId xmlns:a16="http://schemas.microsoft.com/office/drawing/2014/main" id="{547B6DB2-0CC1-4E3F-A59F-14514FC55285}"/>
+              </a:ext>
+            </a:extLst>
+          </p:cNvPr>
+          <p:cNvSpPr/>
+          <p:nvPr/>
+        </p:nvSpPr>
+        <p:spPr>
+          <a:xfrm rot="5400000">
+            <a:off x="3031327" y="5262563"/>
+            <a:ext cx="581025" cy="161925"/>
+          </a:xfrm>
+          <a:prstGeom prst="rect">
+            <a:avLst/>
+          </a:prstGeom>
+          <a:solidFill>
+            <a:srgbClr val="D6DCE5"/>
+          </a:solidFill>
+          <a:ln>
+            <a:noFill/>
+          </a:ln>
+        </p:spPr>
+        <p:style>
+          <a:lnRef idx="2">
+            <a:schemeClr val="accent1">
+              <a:shade val="50000"/>
+            </a:schemeClr>
+          </a:lnRef>
+          <a:fillRef idx="1">
+            <a:schemeClr val="accent1"/>
+          </a:fillRef>
+          <a:effectRef idx="0">
+            <a:schemeClr val="accent1"/>
+          </a:effectRef>
+          <a:fontRef idx="minor">
+            <a:schemeClr val="lt1"/>
+          </a:fontRef>
+        </p:style>
+        <p:txBody>
+          <a:bodyPr rtlCol="0" anchor="ctr"/>
+          <a:lstStyle/>
+          <a:p>
+            <a:pPr algn="ctr"/>
+            <a:endParaRPr lang="de-DE"/>
+          </a:p>
+        </p:txBody>
+      </p:sp>
+      <p:sp>
+        <p:nvSpPr>
+          <p:cNvPr id="20" name="Pfeil: nach rechts 19">
+            <a:extLst>
+              <a:ext uri="{FF2B5EF4-FFF2-40B4-BE49-F238E27FC236}">
+                <a16:creationId xmlns:a16="http://schemas.microsoft.com/office/drawing/2014/main" id="{0ABCF2EB-9A46-4668-A3A9-1559701052A2}"/>
+              </a:ext>
+            </a:extLst>
+          </p:cNvPr>
+          <p:cNvSpPr/>
+          <p:nvPr/>
+        </p:nvSpPr>
+        <p:spPr>
+          <a:xfrm>
+            <a:off x="3355659" y="4351076"/>
+            <a:ext cx="1256860" cy="317898"/>
+          </a:xfrm>
+          <a:prstGeom prst="rightArrow">
+            <a:avLst/>
+          </a:prstGeom>
+          <a:solidFill>
+            <a:srgbClr val="D6DCE5"/>
+          </a:solidFill>
+          <a:ln>
+            <a:noFill/>
+          </a:ln>
+        </p:spPr>
+        <p:style>
+          <a:lnRef idx="2">
+            <a:schemeClr val="accent1">
+              <a:shade val="50000"/>
+            </a:schemeClr>
+          </a:lnRef>
+          <a:fillRef idx="1">
+            <a:schemeClr val="accent1"/>
+          </a:fillRef>
+          <a:effectRef idx="0">
+            <a:schemeClr val="accent1"/>
+          </a:effectRef>
+          <a:fontRef idx="minor">
+            <a:schemeClr val="lt1"/>
+          </a:fontRef>
+        </p:style>
+        <p:txBody>
+          <a:bodyPr rtlCol="0" anchor="ctr"/>
+          <a:lstStyle/>
+          <a:p>
+            <a:pPr algn="ctr"/>
+            <a:endParaRPr lang="de-DE"/>
+          </a:p>
+        </p:txBody>
+      </p:sp>
+      <p:sp>
+        <p:nvSpPr>
+          <p:cNvPr id="13" name="Pfeil: nach rechts 12">
+            <a:extLst>
+              <a:ext uri="{FF2B5EF4-FFF2-40B4-BE49-F238E27FC236}">
+                <a16:creationId xmlns:a16="http://schemas.microsoft.com/office/drawing/2014/main" id="{450DD977-C9E8-4005-AE12-72EF5716B9CB}"/>
+              </a:ext>
+            </a:extLst>
+          </p:cNvPr>
+          <p:cNvSpPr/>
+          <p:nvPr/>
+        </p:nvSpPr>
+        <p:spPr>
+          <a:xfrm>
+            <a:off x="3293745" y="3271600"/>
+            <a:ext cx="1318773" cy="317898"/>
+          </a:xfrm>
+          <a:prstGeom prst="rightArrow">
+            <a:avLst/>
+          </a:prstGeom>
+          <a:solidFill>
+            <a:srgbClr val="D6DCE5"/>
+          </a:solidFill>
+          <a:ln>
+            <a:noFill/>
+          </a:ln>
+        </p:spPr>
+        <p:style>
+          <a:lnRef idx="2">
+            <a:schemeClr val="accent1">
+              <a:shade val="50000"/>
+            </a:schemeClr>
+          </a:lnRef>
+          <a:fillRef idx="1">
+            <a:schemeClr val="accent1"/>
+          </a:fillRef>
+          <a:effectRef idx="0">
+            <a:schemeClr val="accent1"/>
+          </a:effectRef>
+          <a:fontRef idx="minor">
+            <a:schemeClr val="lt1"/>
+          </a:fontRef>
+        </p:style>
+        <p:txBody>
+          <a:bodyPr rtlCol="0" anchor="ctr"/>
+          <a:lstStyle/>
+          <a:p>
+            <a:pPr algn="ctr"/>
+            <a:endParaRPr lang="de-DE"/>
+          </a:p>
+        </p:txBody>
+      </p:sp>
+      <p:sp>
+        <p:nvSpPr>
+          <p:cNvPr id="2" name="Titel 1">
+            <a:extLst>
+              <a:ext uri="{FF2B5EF4-FFF2-40B4-BE49-F238E27FC236}">
+                <a16:creationId xmlns:a16="http://schemas.microsoft.com/office/drawing/2014/main" id="{0551B04D-69E8-4BFE-9F1D-951E570F0118}"/>
+              </a:ext>
+            </a:extLst>
+          </p:cNvPr>
+          <p:cNvSpPr>
+            <a:spLocks noGrp="1"/>
+          </p:cNvSpPr>
+          <p:nvPr>
+            <p:ph type="title"/>
+          </p:nvPr>
+        </p:nvSpPr>
+        <p:spPr/>
+        <p:txBody>
+          <a:bodyPr/>
+          <a:lstStyle/>
+          <a:p>
+            <a:r>
+              <a:rPr lang="de-DE"/>
+              <a:t>coding-service.png</a:t>
+            </a:r>
+          </a:p>
+        </p:txBody>
+      </p:sp>
+      <p:sp>
+        <p:nvSpPr>
+          <p:cNvPr id="4" name="Pfeil: nach rechts 3">
+            <a:extLst>
+              <a:ext uri="{FF2B5EF4-FFF2-40B4-BE49-F238E27FC236}">
+                <a16:creationId xmlns:a16="http://schemas.microsoft.com/office/drawing/2014/main" id="{9F9BAA5E-6368-402F-A075-A399214FBCD8}"/>
+              </a:ext>
+            </a:extLst>
+          </p:cNvPr>
+          <p:cNvSpPr/>
+          <p:nvPr/>
+        </p:nvSpPr>
+        <p:spPr>
+          <a:xfrm rot="5400000">
+            <a:off x="2944315" y="2249102"/>
+            <a:ext cx="754737" cy="317898"/>
+          </a:xfrm>
+          <a:prstGeom prst="rightArrow">
+            <a:avLst/>
+          </a:prstGeom>
+          <a:solidFill>
+            <a:srgbClr val="D6DCE5"/>
+          </a:solidFill>
+          <a:ln>
+            <a:noFill/>
+          </a:ln>
+        </p:spPr>
+        <p:style>
+          <a:lnRef idx="2">
+            <a:schemeClr val="accent1">
+              <a:shade val="50000"/>
+            </a:schemeClr>
+          </a:lnRef>
+          <a:fillRef idx="1">
+            <a:schemeClr val="accent1"/>
+          </a:fillRef>
+          <a:effectRef idx="0">
+            <a:schemeClr val="accent1"/>
+          </a:effectRef>
+          <a:fontRef idx="minor">
+            <a:schemeClr val="lt1"/>
+          </a:fontRef>
+        </p:style>
+        <p:txBody>
+          <a:bodyPr rtlCol="0" anchor="ctr"/>
+          <a:lstStyle/>
+          <a:p>
+            <a:pPr algn="ctr"/>
+            <a:endParaRPr lang="de-DE"/>
+          </a:p>
+        </p:txBody>
+      </p:sp>
+      <p:sp>
+        <p:nvSpPr>
+          <p:cNvPr id="5" name="Rechteck 4">
+            <a:extLst>
+              <a:ext uri="{FF2B5EF4-FFF2-40B4-BE49-F238E27FC236}">
+                <a16:creationId xmlns:a16="http://schemas.microsoft.com/office/drawing/2014/main" id="{8D492F30-5400-4C0A-AFC2-EAC63131E272}"/>
+              </a:ext>
+            </a:extLst>
+          </p:cNvPr>
+          <p:cNvSpPr/>
+          <p:nvPr/>
+        </p:nvSpPr>
+        <p:spPr>
+          <a:xfrm>
+            <a:off x="2865482" y="2138628"/>
+            <a:ext cx="912402" cy="465410"/>
+          </a:xfrm>
+          <a:prstGeom prst="rect">
+            <a:avLst/>
+          </a:prstGeom>
+          <a:noFill/>
+          <a:ln>
+            <a:noFill/>
+          </a:ln>
+        </p:spPr>
+        <p:style>
+          <a:lnRef idx="2">
+            <a:schemeClr val="accent1">
+              <a:shade val="50000"/>
+            </a:schemeClr>
+          </a:lnRef>
+          <a:fillRef idx="1">
+            <a:schemeClr val="accent1"/>
+          </a:fillRef>
+          <a:effectRef idx="0">
+            <a:schemeClr val="accent1"/>
+          </a:effectRef>
+          <a:fontRef idx="minor">
+            <a:schemeClr val="lt1"/>
+          </a:fontRef>
+        </p:style>
+        <p:txBody>
+          <a:bodyPr rtlCol="0" anchor="t"/>
+          <a:lstStyle/>
+          <a:p>
+            <a:pPr algn="ctr"/>
+            <a:r>
+              <a:rPr lang="de-DE" sz="1200">
+                <a:solidFill>
+                  <a:srgbClr val="405786"/>
+                </a:solidFill>
+              </a:rPr>
+              <a:t>Antworten (Variablen)</a:t>
+            </a:r>
+            <a:endParaRPr lang="de-DE" sz="1400">
+              <a:solidFill>
+                <a:srgbClr val="405786"/>
+              </a:solidFill>
+            </a:endParaRPr>
+          </a:p>
+        </p:txBody>
+      </p:sp>
+      <p:sp>
+        <p:nvSpPr>
+          <p:cNvPr id="6" name="Pfeil: nach rechts 5">
+            <a:extLst>
+              <a:ext uri="{FF2B5EF4-FFF2-40B4-BE49-F238E27FC236}">
+                <a16:creationId xmlns:a16="http://schemas.microsoft.com/office/drawing/2014/main" id="{E68CA616-A0ED-4681-BB13-5AC00C9707F9}"/>
+              </a:ext>
+            </a:extLst>
+          </p:cNvPr>
+          <p:cNvSpPr/>
+          <p:nvPr/>
+        </p:nvSpPr>
+        <p:spPr>
+          <a:xfrm rot="5400000">
+            <a:off x="2944315" y="3330861"/>
+            <a:ext cx="754737" cy="317898"/>
+          </a:xfrm>
+          <a:prstGeom prst="rightArrow">
+            <a:avLst/>
+          </a:prstGeom>
+          <a:solidFill>
+            <a:srgbClr val="D6DCE5"/>
+          </a:solidFill>
+          <a:ln>
+            <a:noFill/>
+          </a:ln>
+        </p:spPr>
+        <p:style>
+          <a:lnRef idx="2">
+            <a:schemeClr val="accent1">
+              <a:shade val="50000"/>
+            </a:schemeClr>
+          </a:lnRef>
+          <a:fillRef idx="1">
+            <a:schemeClr val="accent1"/>
+          </a:fillRef>
+          <a:effectRef idx="0">
+            <a:schemeClr val="accent1"/>
+          </a:effectRef>
+          <a:fontRef idx="minor">
+            <a:schemeClr val="lt1"/>
+          </a:fontRef>
+        </p:style>
+        <p:txBody>
+          <a:bodyPr rtlCol="0" anchor="ctr"/>
+          <a:lstStyle/>
+          <a:p>
+            <a:pPr algn="ctr"/>
+            <a:endParaRPr lang="de-DE"/>
+          </a:p>
+        </p:txBody>
+      </p:sp>
+      <p:sp>
+        <p:nvSpPr>
+          <p:cNvPr id="7" name="Rechteck 6">
+            <a:extLst>
+              <a:ext uri="{FF2B5EF4-FFF2-40B4-BE49-F238E27FC236}">
+                <a16:creationId xmlns:a16="http://schemas.microsoft.com/office/drawing/2014/main" id="{9CEA54E5-572E-4CCE-A5EF-D17BB6BA5FFC}"/>
+              </a:ext>
+            </a:extLst>
+          </p:cNvPr>
+          <p:cNvSpPr/>
+          <p:nvPr/>
+        </p:nvSpPr>
+        <p:spPr>
+          <a:xfrm>
+            <a:off x="2865482" y="3208925"/>
+            <a:ext cx="912402" cy="443249"/>
+          </a:xfrm>
+          <a:prstGeom prst="rect">
+            <a:avLst/>
+          </a:prstGeom>
+          <a:noFill/>
+          <a:ln>
+            <a:noFill/>
+          </a:ln>
+        </p:spPr>
+        <p:style>
+          <a:lnRef idx="2">
+            <a:schemeClr val="accent1">
+              <a:shade val="50000"/>
+            </a:schemeClr>
+          </a:lnRef>
+          <a:fillRef idx="1">
+            <a:schemeClr val="accent1"/>
+          </a:fillRef>
+          <a:effectRef idx="0">
+            <a:schemeClr val="accent1"/>
+          </a:effectRef>
+          <a:fontRef idx="minor">
+            <a:schemeClr val="lt1"/>
+          </a:fontRef>
+        </p:style>
+        <p:txBody>
+          <a:bodyPr rtlCol="0" anchor="t"/>
+          <a:lstStyle/>
+          <a:p>
+            <a:pPr algn="ctr"/>
+            <a:r>
+              <a:rPr lang="de-DE" sz="1200">
+                <a:solidFill>
+                  <a:srgbClr val="405786"/>
+                </a:solidFill>
+              </a:rPr>
+              <a:t>kodierte Antworten</a:t>
+            </a:r>
+            <a:endParaRPr lang="de-DE" sz="1400">
+              <a:solidFill>
+                <a:srgbClr val="405786"/>
+              </a:solidFill>
+            </a:endParaRPr>
+          </a:p>
+        </p:txBody>
+      </p:sp>
+      <p:sp>
+        <p:nvSpPr>
+          <p:cNvPr id="3" name="Rechteck: abgerundete Ecken 2">
+            <a:extLst>
+              <a:ext uri="{FF2B5EF4-FFF2-40B4-BE49-F238E27FC236}">
+                <a16:creationId xmlns:a16="http://schemas.microsoft.com/office/drawing/2014/main" id="{6B49916C-9FB5-4D32-B4BD-F9242855DD09}"/>
+              </a:ext>
+            </a:extLst>
+          </p:cNvPr>
+          <p:cNvSpPr/>
+          <p:nvPr/>
+        </p:nvSpPr>
+        <p:spPr>
+          <a:xfrm>
+            <a:off x="2483556" y="2807582"/>
+            <a:ext cx="1676257" cy="318109"/>
+          </a:xfrm>
+          <a:prstGeom prst="roundRect">
+            <a:avLst/>
+          </a:prstGeom>
+          <a:solidFill>
+            <a:srgbClr val="405786"/>
+          </a:solidFill>
+          <a:ln>
+            <a:noFill/>
+          </a:ln>
+        </p:spPr>
+        <p:style>
+          <a:lnRef idx="2">
+            <a:schemeClr val="accent1">
+              <a:shade val="50000"/>
+            </a:schemeClr>
+          </a:lnRef>
+          <a:fillRef idx="1">
+            <a:schemeClr val="accent1"/>
+          </a:fillRef>
+          <a:effectRef idx="0">
+            <a:schemeClr val="accent1"/>
+          </a:effectRef>
+          <a:fontRef idx="minor">
+            <a:schemeClr val="lt1"/>
+          </a:fontRef>
+        </p:style>
+        <p:txBody>
+          <a:bodyPr rtlCol="0" anchor="ctr"/>
+          <a:lstStyle/>
+          <a:p>
+            <a:pPr algn="ctr"/>
+            <a:r>
+              <a:rPr lang="de-DE" sz="1200"/>
+              <a:t>Autocoder</a:t>
+            </a:r>
+          </a:p>
+        </p:txBody>
+      </p:sp>
+      <p:sp>
+        <p:nvSpPr>
+          <p:cNvPr id="9" name="Pfeil: nach rechts 8">
+            <a:extLst>
+              <a:ext uri="{FF2B5EF4-FFF2-40B4-BE49-F238E27FC236}">
+                <a16:creationId xmlns:a16="http://schemas.microsoft.com/office/drawing/2014/main" id="{F5B0DB56-B8B8-4F09-B779-DBDCC2B8FBB8}"/>
+              </a:ext>
+            </a:extLst>
+          </p:cNvPr>
+          <p:cNvSpPr/>
+          <p:nvPr/>
+        </p:nvSpPr>
+        <p:spPr>
+          <a:xfrm>
+            <a:off x="1558749" y="3881358"/>
+            <a:ext cx="912402" cy="317898"/>
+          </a:xfrm>
+          <a:prstGeom prst="rightArrow">
+            <a:avLst/>
+          </a:prstGeom>
+          <a:solidFill>
+            <a:srgbClr val="D6DCE5"/>
+          </a:solidFill>
+          <a:ln>
+            <a:noFill/>
+          </a:ln>
+        </p:spPr>
+        <p:style>
+          <a:lnRef idx="2">
+            <a:schemeClr val="accent1">
+              <a:shade val="50000"/>
+            </a:schemeClr>
+          </a:lnRef>
+          <a:fillRef idx="1">
+            <a:schemeClr val="accent1"/>
+          </a:fillRef>
+          <a:effectRef idx="0">
+            <a:schemeClr val="accent1"/>
+          </a:effectRef>
+          <a:fontRef idx="minor">
+            <a:schemeClr val="lt1"/>
+          </a:fontRef>
+        </p:style>
+        <p:txBody>
+          <a:bodyPr rtlCol="0" anchor="ctr"/>
+          <a:lstStyle/>
+          <a:p>
+            <a:pPr algn="ctr"/>
+            <a:endParaRPr lang="de-DE"/>
+          </a:p>
+        </p:txBody>
+      </p:sp>
+      <p:sp>
+        <p:nvSpPr>
+          <p:cNvPr id="11" name="Pfeil: nach rechts 10">
+            <a:extLst>
+              <a:ext uri="{FF2B5EF4-FFF2-40B4-BE49-F238E27FC236}">
+                <a16:creationId xmlns:a16="http://schemas.microsoft.com/office/drawing/2014/main" id="{952B01B7-7CA7-4859-911C-8ED90D36D649}"/>
+              </a:ext>
+            </a:extLst>
+          </p:cNvPr>
+          <p:cNvSpPr/>
+          <p:nvPr/>
+        </p:nvSpPr>
+        <p:spPr>
+          <a:xfrm rot="5400000">
+            <a:off x="2944314" y="4390458"/>
+            <a:ext cx="754737" cy="317898"/>
+          </a:xfrm>
+          <a:prstGeom prst="rightArrow">
+            <a:avLst/>
+          </a:prstGeom>
+          <a:solidFill>
+            <a:srgbClr val="D6DCE5"/>
+          </a:solidFill>
+          <a:ln>
+            <a:noFill/>
+          </a:ln>
+        </p:spPr>
+        <p:style>
+          <a:lnRef idx="2">
+            <a:schemeClr val="accent1">
+              <a:shade val="50000"/>
+            </a:schemeClr>
+          </a:lnRef>
+          <a:fillRef idx="1">
+            <a:schemeClr val="accent1"/>
+          </a:fillRef>
+          <a:effectRef idx="0">
+            <a:schemeClr val="accent1"/>
+          </a:effectRef>
+          <a:fontRef idx="minor">
+            <a:schemeClr val="lt1"/>
+          </a:fontRef>
+        </p:style>
+        <p:txBody>
+          <a:bodyPr rtlCol="0" anchor="ctr"/>
+          <a:lstStyle/>
+          <a:p>
+            <a:pPr algn="ctr"/>
+            <a:endParaRPr lang="de-DE"/>
+          </a:p>
+        </p:txBody>
+      </p:sp>
+      <p:sp>
+        <p:nvSpPr>
+          <p:cNvPr id="12" name="Rechteck 11">
+            <a:extLst>
+              <a:ext uri="{FF2B5EF4-FFF2-40B4-BE49-F238E27FC236}">
+                <a16:creationId xmlns:a16="http://schemas.microsoft.com/office/drawing/2014/main" id="{5BF43FF3-FD4D-4671-BBE2-2F5FFF6683B1}"/>
+              </a:ext>
+            </a:extLst>
+          </p:cNvPr>
+          <p:cNvSpPr/>
+          <p:nvPr/>
+        </p:nvSpPr>
+        <p:spPr>
+          <a:xfrm>
+            <a:off x="2865481" y="4268522"/>
+            <a:ext cx="912402" cy="443249"/>
+          </a:xfrm>
+          <a:prstGeom prst="rect">
+            <a:avLst/>
+          </a:prstGeom>
+          <a:noFill/>
+          <a:ln>
+            <a:noFill/>
+          </a:ln>
+        </p:spPr>
+        <p:style>
+          <a:lnRef idx="2">
+            <a:schemeClr val="accent1">
+              <a:shade val="50000"/>
+            </a:schemeClr>
+          </a:lnRef>
+          <a:fillRef idx="1">
+            <a:schemeClr val="accent1"/>
+          </a:fillRef>
+          <a:effectRef idx="0">
+            <a:schemeClr val="accent1"/>
+          </a:effectRef>
+          <a:fontRef idx="minor">
+            <a:schemeClr val="lt1"/>
+          </a:fontRef>
+        </p:style>
+        <p:txBody>
+          <a:bodyPr rtlCol="0" anchor="t"/>
+          <a:lstStyle/>
+          <a:p>
+            <a:pPr algn="ctr"/>
+            <a:r>
+              <a:rPr lang="de-DE" sz="1200">
+                <a:solidFill>
+                  <a:srgbClr val="405786"/>
+                </a:solidFill>
+              </a:rPr>
+              <a:t>Item-Matrix</a:t>
+            </a:r>
+            <a:endParaRPr lang="de-DE" sz="1400">
+              <a:solidFill>
+                <a:srgbClr val="405786"/>
+              </a:solidFill>
+            </a:endParaRPr>
+          </a:p>
+        </p:txBody>
+      </p:sp>
+      <p:sp>
+        <p:nvSpPr>
+          <p:cNvPr id="8" name="Rechteck: abgerundete Ecken 7">
+            <a:extLst>
+              <a:ext uri="{FF2B5EF4-FFF2-40B4-BE49-F238E27FC236}">
+                <a16:creationId xmlns:a16="http://schemas.microsoft.com/office/drawing/2014/main" id="{FC665028-AAC4-4D57-AEAD-4DB95B7E292B}"/>
+              </a:ext>
+            </a:extLst>
+          </p:cNvPr>
+          <p:cNvSpPr/>
+          <p:nvPr/>
+        </p:nvSpPr>
+        <p:spPr>
+          <a:xfrm>
+            <a:off x="2483556" y="3881358"/>
+            <a:ext cx="1676257" cy="318109"/>
+          </a:xfrm>
+          <a:prstGeom prst="roundRect">
+            <a:avLst/>
+          </a:prstGeom>
+          <a:solidFill>
+            <a:srgbClr val="405786"/>
+          </a:solidFill>
+          <a:ln>
+            <a:noFill/>
+          </a:ln>
+        </p:spPr>
+        <p:style>
+          <a:lnRef idx="2">
+            <a:schemeClr val="accent1">
+              <a:shade val="50000"/>
+            </a:schemeClr>
+          </a:lnRef>
+          <a:fillRef idx="1">
+            <a:schemeClr val="accent1"/>
+          </a:fillRef>
+          <a:effectRef idx="0">
+            <a:schemeClr val="accent1"/>
+          </a:effectRef>
+          <a:fontRef idx="minor">
+            <a:schemeClr val="lt1"/>
+          </a:fontRef>
+        </p:style>
+        <p:txBody>
+          <a:bodyPr rtlCol="0" anchor="ctr"/>
+          <a:lstStyle/>
+          <a:p>
+            <a:pPr algn="ctr"/>
+            <a:r>
+              <a:rPr lang="de-DE" sz="1200"/>
+              <a:t>Itemwerte ableiten</a:t>
+            </a:r>
+          </a:p>
+        </p:txBody>
+      </p:sp>
+      <p:sp>
+        <p:nvSpPr>
+          <p:cNvPr id="15" name="Pfeil: nach rechts 14">
+            <a:extLst>
+              <a:ext uri="{FF2B5EF4-FFF2-40B4-BE49-F238E27FC236}">
+                <a16:creationId xmlns:a16="http://schemas.microsoft.com/office/drawing/2014/main" id="{863A3B5F-DF6D-42E3-B140-36287F671703}"/>
+              </a:ext>
+            </a:extLst>
+          </p:cNvPr>
+          <p:cNvSpPr/>
+          <p:nvPr/>
+        </p:nvSpPr>
+        <p:spPr>
+          <a:xfrm>
+            <a:off x="1558749" y="4926776"/>
+            <a:ext cx="912402" cy="317898"/>
+          </a:xfrm>
+          <a:prstGeom prst="rightArrow">
+            <a:avLst/>
+          </a:prstGeom>
+          <a:solidFill>
+            <a:srgbClr val="D6DCE5"/>
+          </a:solidFill>
+          <a:ln>
+            <a:noFill/>
+          </a:ln>
+        </p:spPr>
+        <p:style>
+          <a:lnRef idx="2">
+            <a:schemeClr val="accent1">
+              <a:shade val="50000"/>
+            </a:schemeClr>
+          </a:lnRef>
+          <a:fillRef idx="1">
+            <a:schemeClr val="accent1"/>
+          </a:fillRef>
+          <a:effectRef idx="0">
+            <a:schemeClr val="accent1"/>
+          </a:effectRef>
+          <a:fontRef idx="minor">
+            <a:schemeClr val="lt1"/>
+          </a:fontRef>
+        </p:style>
+        <p:txBody>
+          <a:bodyPr rtlCol="0" anchor="ctr"/>
+          <a:lstStyle/>
+          <a:p>
+            <a:pPr algn="ctr"/>
+            <a:endParaRPr lang="de-DE"/>
+          </a:p>
+        </p:txBody>
+      </p:sp>
+      <p:sp>
+        <p:nvSpPr>
+          <p:cNvPr id="19" name="Rechteck: abgerundete Ecken 18">
+            <a:extLst>
+              <a:ext uri="{FF2B5EF4-FFF2-40B4-BE49-F238E27FC236}">
+                <a16:creationId xmlns:a16="http://schemas.microsoft.com/office/drawing/2014/main" id="{BE4BD864-25C8-4FB2-8119-D940D979F705}"/>
+              </a:ext>
+            </a:extLst>
+          </p:cNvPr>
+          <p:cNvSpPr/>
+          <p:nvPr/>
+        </p:nvSpPr>
+        <p:spPr>
+          <a:xfrm>
+            <a:off x="2483556" y="4926776"/>
+            <a:ext cx="1676257" cy="318109"/>
+          </a:xfrm>
+          <a:prstGeom prst="roundRect">
+            <a:avLst/>
+          </a:prstGeom>
+          <a:solidFill>
+            <a:srgbClr val="405786"/>
+          </a:solidFill>
+          <a:ln>
+            <a:noFill/>
+          </a:ln>
+        </p:spPr>
+        <p:style>
+          <a:lnRef idx="2">
+            <a:schemeClr val="accent1">
+              <a:shade val="50000"/>
+            </a:schemeClr>
+          </a:lnRef>
+          <a:fillRef idx="1">
+            <a:schemeClr val="accent1"/>
+          </a:fillRef>
+          <a:effectRef idx="0">
+            <a:schemeClr val="accent1"/>
+          </a:effectRef>
+          <a:fontRef idx="minor">
+            <a:schemeClr val="lt1"/>
+          </a:fontRef>
+        </p:style>
+        <p:txBody>
+          <a:bodyPr rtlCol="0" anchor="ctr"/>
+          <a:lstStyle/>
+          <a:p>
+            <a:pPr algn="ctr"/>
+            <a:r>
+              <a:rPr lang="de-DE" sz="1200"/>
+              <a:t>Skalenwerte ableiten</a:t>
+            </a:r>
+          </a:p>
+        </p:txBody>
+      </p:sp>
+      <p:sp>
+        <p:nvSpPr>
+          <p:cNvPr id="22" name="Pfeil: nach rechts 21">
+            <a:extLst>
+              <a:ext uri="{FF2B5EF4-FFF2-40B4-BE49-F238E27FC236}">
+                <a16:creationId xmlns:a16="http://schemas.microsoft.com/office/drawing/2014/main" id="{B7BEFAAF-3039-4C25-8A91-9764F8C2F4EC}"/>
+              </a:ext>
+            </a:extLst>
+          </p:cNvPr>
+          <p:cNvSpPr/>
+          <p:nvPr/>
+        </p:nvSpPr>
+        <p:spPr>
+          <a:xfrm>
+            <a:off x="1558749" y="2815339"/>
+            <a:ext cx="912402" cy="317898"/>
+          </a:xfrm>
+          <a:prstGeom prst="rightArrow">
+            <a:avLst/>
+          </a:prstGeom>
+          <a:solidFill>
+            <a:srgbClr val="D6DCE5"/>
+          </a:solidFill>
+          <a:ln>
+            <a:noFill/>
+          </a:ln>
+        </p:spPr>
+        <p:style>
+          <a:lnRef idx="2">
+            <a:schemeClr val="accent1">
+              <a:shade val="50000"/>
+            </a:schemeClr>
+          </a:lnRef>
+          <a:fillRef idx="1">
+            <a:schemeClr val="accent1"/>
+          </a:fillRef>
+          <a:effectRef idx="0">
+            <a:schemeClr val="accent1"/>
+          </a:effectRef>
+          <a:fontRef idx="minor">
+            <a:schemeClr val="lt1"/>
+          </a:fontRef>
+        </p:style>
+        <p:txBody>
+          <a:bodyPr rtlCol="0" anchor="ctr"/>
+          <a:lstStyle/>
+          <a:p>
+            <a:pPr algn="ctr"/>
+            <a:endParaRPr lang="de-DE"/>
+          </a:p>
+        </p:txBody>
+      </p:sp>
+      <p:sp>
+        <p:nvSpPr>
+          <p:cNvPr id="24" name="Rechteck: abgerundete Ecken 23">
+            <a:extLst>
+              <a:ext uri="{FF2B5EF4-FFF2-40B4-BE49-F238E27FC236}">
+                <a16:creationId xmlns:a16="http://schemas.microsoft.com/office/drawing/2014/main" id="{55A149B1-1B8A-4A2A-A04E-957240767D97}"/>
+              </a:ext>
+            </a:extLst>
+          </p:cNvPr>
+          <p:cNvSpPr/>
+          <p:nvPr/>
+        </p:nvSpPr>
+        <p:spPr>
+          <a:xfrm>
+            <a:off x="2471151" y="1785355"/>
+            <a:ext cx="1676257" cy="318109"/>
+          </a:xfrm>
+          <a:prstGeom prst="roundRect">
+            <a:avLst/>
+          </a:prstGeom>
+          <a:solidFill>
+            <a:schemeClr val="accent5">
+              <a:lumMod val="75000"/>
+            </a:schemeClr>
+          </a:solidFill>
+        </p:spPr>
+        <p:style>
+          <a:lnRef idx="2">
+            <a:schemeClr val="accent1">
+              <a:shade val="50000"/>
+            </a:schemeClr>
+          </a:lnRef>
+          <a:fillRef idx="1">
+            <a:schemeClr val="accent1"/>
+          </a:fillRef>
+          <a:effectRef idx="0">
+            <a:schemeClr val="accent1"/>
+          </a:effectRef>
+          <a:fontRef idx="minor">
+            <a:schemeClr val="lt1"/>
+          </a:fontRef>
+        </p:style>
+        <p:txBody>
+          <a:bodyPr rtlCol="0" anchor="ctr"/>
+          <a:lstStyle/>
+          <a:p>
+            <a:pPr algn="ctr"/>
+            <a:r>
+              <a:rPr lang="de-DE" sz="1400"/>
+              <a:t>IQB-Testcenter</a:t>
+            </a:r>
+            <a:endParaRPr lang="de-DE"/>
+          </a:p>
+        </p:txBody>
+      </p:sp>
+      <p:sp>
+        <p:nvSpPr>
+          <p:cNvPr id="26" name="Rechteck 25">
+            <a:extLst>
+              <a:ext uri="{FF2B5EF4-FFF2-40B4-BE49-F238E27FC236}">
+                <a16:creationId xmlns:a16="http://schemas.microsoft.com/office/drawing/2014/main" id="{7C023EEC-9FC4-4437-8575-93036B4F18E1}"/>
+              </a:ext>
+            </a:extLst>
+          </p:cNvPr>
+          <p:cNvSpPr/>
+          <p:nvPr/>
+        </p:nvSpPr>
+        <p:spPr>
+          <a:xfrm>
+            <a:off x="650959" y="2604038"/>
+            <a:ext cx="1391955" cy="3155038"/>
+          </a:xfrm>
+          <a:prstGeom prst="rect">
+            <a:avLst/>
+          </a:prstGeom>
+          <a:solidFill>
+            <a:srgbClr val="D6DCE5"/>
+          </a:solidFill>
+          <a:ln>
+            <a:noFill/>
+          </a:ln>
+        </p:spPr>
+        <p:style>
+          <a:lnRef idx="2">
+            <a:schemeClr val="accent1">
+              <a:shade val="50000"/>
+            </a:schemeClr>
+          </a:lnRef>
+          <a:fillRef idx="1">
+            <a:schemeClr val="accent1"/>
+          </a:fillRef>
+          <a:effectRef idx="0">
+            <a:schemeClr val="accent1"/>
+          </a:effectRef>
+          <a:fontRef idx="minor">
+            <a:schemeClr val="lt1"/>
+          </a:fontRef>
+        </p:style>
+        <p:txBody>
+          <a:bodyPr rtlCol="0" anchor="ctr"/>
+          <a:lstStyle/>
+          <a:p>
+            <a:r>
+              <a:rPr lang="de-DE" sz="1600">
+                <a:solidFill>
+                  <a:srgbClr val="405786"/>
+                </a:solidFill>
+              </a:rPr>
+              <a:t>Survey Content Package</a:t>
+            </a:r>
+          </a:p>
+        </p:txBody>
+      </p:sp>
+      <p:sp>
+        <p:nvSpPr>
+          <p:cNvPr id="31" name="Pfeil: nach rechts 30">
+            <a:extLst>
+              <a:ext uri="{FF2B5EF4-FFF2-40B4-BE49-F238E27FC236}">
+                <a16:creationId xmlns:a16="http://schemas.microsoft.com/office/drawing/2014/main" id="{F8E2932E-4F89-4729-ADD8-F68E6AF23094}"/>
+              </a:ext>
+            </a:extLst>
+          </p:cNvPr>
+          <p:cNvSpPr/>
+          <p:nvPr/>
+        </p:nvSpPr>
+        <p:spPr>
+          <a:xfrm>
+            <a:off x="3355659" y="5398381"/>
+            <a:ext cx="1256860" cy="317898"/>
+          </a:xfrm>
+          <a:prstGeom prst="rightArrow">
+            <a:avLst/>
+          </a:prstGeom>
+          <a:solidFill>
+            <a:srgbClr val="D6DCE5"/>
+          </a:solidFill>
+          <a:ln>
+            <a:noFill/>
+          </a:ln>
+        </p:spPr>
+        <p:style>
+          <a:lnRef idx="2">
+            <a:schemeClr val="accent1">
+              <a:shade val="50000"/>
+            </a:schemeClr>
+          </a:lnRef>
+          <a:fillRef idx="1">
+            <a:schemeClr val="accent1"/>
+          </a:fillRef>
+          <a:effectRef idx="0">
+            <a:schemeClr val="accent1"/>
+          </a:effectRef>
+          <a:fontRef idx="minor">
+            <a:schemeClr val="lt1"/>
+          </a:fontRef>
+        </p:style>
+        <p:txBody>
+          <a:bodyPr rtlCol="0" anchor="ctr"/>
+          <a:lstStyle/>
+          <a:p>
+            <a:pPr algn="ctr"/>
+            <a:endParaRPr lang="de-DE"/>
+          </a:p>
+        </p:txBody>
+      </p:sp>
+      <p:sp>
+        <p:nvSpPr>
+          <p:cNvPr id="33" name="Rechteck 32">
+            <a:extLst>
+              <a:ext uri="{FF2B5EF4-FFF2-40B4-BE49-F238E27FC236}">
+                <a16:creationId xmlns:a16="http://schemas.microsoft.com/office/drawing/2014/main" id="{83310E26-0C9A-475F-9432-C5A42F089C26}"/>
+              </a:ext>
+            </a:extLst>
+          </p:cNvPr>
+          <p:cNvSpPr/>
+          <p:nvPr/>
+        </p:nvSpPr>
+        <p:spPr>
+          <a:xfrm>
+            <a:off x="2865481" y="5315827"/>
+            <a:ext cx="1294332" cy="443249"/>
+          </a:xfrm>
+          <a:prstGeom prst="rect">
+            <a:avLst/>
+          </a:prstGeom>
+          <a:noFill/>
+          <a:ln>
+            <a:noFill/>
+          </a:ln>
+        </p:spPr>
+        <p:style>
+          <a:lnRef idx="2">
+            <a:schemeClr val="accent1">
+              <a:shade val="50000"/>
+            </a:schemeClr>
+          </a:lnRef>
+          <a:fillRef idx="1">
+            <a:schemeClr val="accent1"/>
+          </a:fillRef>
+          <a:effectRef idx="0">
+            <a:schemeClr val="accent1"/>
+          </a:effectRef>
+          <a:fontRef idx="minor">
+            <a:schemeClr val="lt1"/>
+          </a:fontRef>
+        </p:style>
+        <p:txBody>
+          <a:bodyPr rtlCol="0" anchor="t"/>
+          <a:lstStyle/>
+          <a:p>
+            <a:pPr algn="ctr"/>
+            <a:r>
+              <a:rPr lang="de-DE" sz="1200">
+                <a:solidFill>
+                  <a:srgbClr val="405786"/>
+                </a:solidFill>
+              </a:rPr>
+              <a:t>Personen-Fähigkeitswerte</a:t>
+            </a:r>
+            <a:endParaRPr lang="de-DE" sz="1400">
+              <a:solidFill>
+                <a:srgbClr val="405786"/>
+              </a:solidFill>
+            </a:endParaRPr>
+          </a:p>
+        </p:txBody>
+      </p:sp>
+      <p:sp>
+        <p:nvSpPr>
+          <p:cNvPr id="10" name="Rechteck 9">
+            <a:extLst>
+              <a:ext uri="{FF2B5EF4-FFF2-40B4-BE49-F238E27FC236}">
+                <a16:creationId xmlns:a16="http://schemas.microsoft.com/office/drawing/2014/main" id="{99160057-E182-4527-98B7-B0410D6C4443}"/>
+              </a:ext>
+            </a:extLst>
+          </p:cNvPr>
+          <p:cNvSpPr/>
+          <p:nvPr/>
+        </p:nvSpPr>
+        <p:spPr>
+          <a:xfrm>
+            <a:off x="1376220" y="3819417"/>
+            <a:ext cx="749160" cy="399738"/>
+          </a:xfrm>
+          <a:prstGeom prst="rect">
+            <a:avLst/>
+          </a:prstGeom>
+          <a:noFill/>
+          <a:ln>
+            <a:noFill/>
+          </a:ln>
+        </p:spPr>
+        <p:style>
+          <a:lnRef idx="2">
+            <a:schemeClr val="accent1">
+              <a:shade val="50000"/>
+            </a:schemeClr>
+          </a:lnRef>
+          <a:fillRef idx="1">
+            <a:schemeClr val="accent1"/>
+          </a:fillRef>
+          <a:effectRef idx="0">
+            <a:schemeClr val="accent1"/>
+          </a:effectRef>
+          <a:fontRef idx="minor">
+            <a:schemeClr val="lt1"/>
+          </a:fontRef>
+        </p:style>
+        <p:txBody>
+          <a:bodyPr rtlCol="0" anchor="t"/>
+          <a:lstStyle/>
+          <a:p>
+            <a:pPr algn="ctr"/>
+            <a:r>
+              <a:rPr lang="de-DE" sz="1200">
+                <a:solidFill>
+                  <a:srgbClr val="405786"/>
+                </a:solidFill>
+              </a:rPr>
+              <a:t>Item-Liste</a:t>
+            </a:r>
+            <a:endParaRPr lang="de-DE" sz="1400">
+              <a:solidFill>
+                <a:srgbClr val="405786"/>
+              </a:solidFill>
+            </a:endParaRPr>
+          </a:p>
+        </p:txBody>
+      </p:sp>
+      <p:sp>
+        <p:nvSpPr>
+          <p:cNvPr id="16" name="Rechteck 15">
+            <a:extLst>
+              <a:ext uri="{FF2B5EF4-FFF2-40B4-BE49-F238E27FC236}">
+                <a16:creationId xmlns:a16="http://schemas.microsoft.com/office/drawing/2014/main" id="{BD5D6F1E-C581-4B54-9809-284B7E13817C}"/>
+              </a:ext>
+            </a:extLst>
+          </p:cNvPr>
+          <p:cNvSpPr/>
+          <p:nvPr/>
+        </p:nvSpPr>
+        <p:spPr>
+          <a:xfrm>
+            <a:off x="1349198" y="4941205"/>
+            <a:ext cx="808852" cy="282673"/>
+          </a:xfrm>
+          <a:prstGeom prst="rect">
+            <a:avLst/>
+          </a:prstGeom>
+          <a:noFill/>
+          <a:ln>
+            <a:noFill/>
+          </a:ln>
+        </p:spPr>
+        <p:style>
+          <a:lnRef idx="2">
+            <a:schemeClr val="accent1">
+              <a:shade val="50000"/>
+            </a:schemeClr>
+          </a:lnRef>
+          <a:fillRef idx="1">
+            <a:schemeClr val="accent1"/>
+          </a:fillRef>
+          <a:effectRef idx="0">
+            <a:schemeClr val="accent1"/>
+          </a:effectRef>
+          <a:fontRef idx="minor">
+            <a:schemeClr val="lt1"/>
+          </a:fontRef>
+        </p:style>
+        <p:txBody>
+          <a:bodyPr rtlCol="0" anchor="t"/>
+          <a:lstStyle/>
+          <a:p>
+            <a:pPr algn="ctr"/>
+            <a:r>
+              <a:rPr lang="de-DE" sz="1200">
+                <a:solidFill>
+                  <a:srgbClr val="405786"/>
+                </a:solidFill>
+              </a:rPr>
+              <a:t>Skalen</a:t>
+            </a:r>
+            <a:endParaRPr lang="de-DE" sz="1400">
+              <a:solidFill>
+                <a:srgbClr val="405786"/>
+              </a:solidFill>
+            </a:endParaRPr>
+          </a:p>
+        </p:txBody>
+      </p:sp>
+      <p:sp>
+        <p:nvSpPr>
+          <p:cNvPr id="23" name="Rechteck 22">
+            <a:extLst>
+              <a:ext uri="{FF2B5EF4-FFF2-40B4-BE49-F238E27FC236}">
+                <a16:creationId xmlns:a16="http://schemas.microsoft.com/office/drawing/2014/main" id="{A0B08DA1-F980-4E18-B4CC-577C8A1BE929}"/>
+              </a:ext>
+            </a:extLst>
+          </p:cNvPr>
+          <p:cNvSpPr/>
+          <p:nvPr/>
+        </p:nvSpPr>
+        <p:spPr>
+          <a:xfrm>
+            <a:off x="1349198" y="2745011"/>
+            <a:ext cx="808852" cy="443249"/>
+          </a:xfrm>
+          <a:prstGeom prst="rect">
+            <a:avLst/>
+          </a:prstGeom>
+          <a:noFill/>
+          <a:ln>
+            <a:noFill/>
+          </a:ln>
+        </p:spPr>
+        <p:style>
+          <a:lnRef idx="2">
+            <a:schemeClr val="accent1">
+              <a:shade val="50000"/>
+            </a:schemeClr>
+          </a:lnRef>
+          <a:fillRef idx="1">
+            <a:schemeClr val="accent1"/>
+          </a:fillRef>
+          <a:effectRef idx="0">
+            <a:schemeClr val="accent1"/>
+          </a:effectRef>
+          <a:fontRef idx="minor">
+            <a:schemeClr val="lt1"/>
+          </a:fontRef>
+        </p:style>
+        <p:txBody>
+          <a:bodyPr rtlCol="0" anchor="t"/>
+          <a:lstStyle/>
+          <a:p>
+            <a:pPr algn="ctr"/>
+            <a:r>
+              <a:rPr lang="de-DE" sz="1200">
+                <a:solidFill>
+                  <a:srgbClr val="405786"/>
+                </a:solidFill>
+              </a:rPr>
+              <a:t>Kodier-Schema</a:t>
+            </a:r>
+            <a:endParaRPr lang="de-DE" sz="1400">
+              <a:solidFill>
+                <a:srgbClr val="405786"/>
+              </a:solidFill>
+            </a:endParaRPr>
+          </a:p>
+        </p:txBody>
+      </p:sp>
+      <p:sp>
+        <p:nvSpPr>
+          <p:cNvPr id="34" name="Rechteck 33">
+            <a:extLst>
+              <a:ext uri="{FF2B5EF4-FFF2-40B4-BE49-F238E27FC236}">
+                <a16:creationId xmlns:a16="http://schemas.microsoft.com/office/drawing/2014/main" id="{05CD6CED-F4A9-4957-9DE7-BC2BF51D10A3}"/>
+              </a:ext>
+            </a:extLst>
+          </p:cNvPr>
+          <p:cNvSpPr/>
+          <p:nvPr/>
+        </p:nvSpPr>
+        <p:spPr>
+          <a:xfrm>
+            <a:off x="4630015" y="2604038"/>
+            <a:ext cx="1391955" cy="3155038"/>
+          </a:xfrm>
+          <a:prstGeom prst="rect">
+            <a:avLst/>
+          </a:prstGeom>
+          <a:solidFill>
+            <a:srgbClr val="D6DCE5"/>
+          </a:solidFill>
+          <a:ln>
+            <a:noFill/>
+          </a:ln>
+        </p:spPr>
+        <p:style>
+          <a:lnRef idx="2">
+            <a:schemeClr val="accent1">
+              <a:shade val="50000"/>
+            </a:schemeClr>
+          </a:lnRef>
+          <a:fillRef idx="1">
+            <a:schemeClr val="accent1"/>
+          </a:fillRef>
+          <a:effectRef idx="0">
+            <a:schemeClr val="accent1"/>
+          </a:effectRef>
+          <a:fontRef idx="minor">
+            <a:schemeClr val="lt1"/>
+          </a:fontRef>
+        </p:style>
+        <p:txBody>
+          <a:bodyPr rtlCol="0" anchor="ctr"/>
+          <a:lstStyle/>
+          <a:p>
+            <a:pPr algn="r"/>
+            <a:r>
+              <a:rPr lang="de-DE" sz="1600">
+                <a:solidFill>
+                  <a:srgbClr val="405786"/>
+                </a:solidFill>
+              </a:rPr>
+              <a:t>Speichern</a:t>
+            </a:r>
+          </a:p>
+          <a:p>
+            <a:pPr algn="r"/>
+            <a:endParaRPr lang="de-DE" sz="1600">
+              <a:solidFill>
+                <a:srgbClr val="405786"/>
+              </a:solidFill>
+            </a:endParaRPr>
+          </a:p>
+          <a:p>
+            <a:pPr algn="r"/>
+            <a:r>
+              <a:rPr lang="de-DE" sz="1600">
+                <a:solidFill>
+                  <a:srgbClr val="405786"/>
+                </a:solidFill>
+              </a:rPr>
+              <a:t>Rückmeldung</a:t>
+            </a:r>
+          </a:p>
+          <a:p>
+            <a:pPr algn="r"/>
+            <a:endParaRPr lang="de-DE" sz="1600">
+              <a:solidFill>
+                <a:srgbClr val="405786"/>
+              </a:solidFill>
+            </a:endParaRPr>
+          </a:p>
+          <a:p>
+            <a:pPr algn="r"/>
+            <a:r>
+              <a:rPr lang="de-DE" sz="1600">
+                <a:solidFill>
+                  <a:srgbClr val="405786"/>
+                </a:solidFill>
+              </a:rPr>
+              <a:t>Dashboard</a:t>
+            </a:r>
+          </a:p>
+        </p:txBody>
+      </p:sp>
+    </p:spTree>
+    <p:extLst>
+      <p:ext uri="{BB962C8B-B14F-4D97-AF65-F5344CB8AC3E}">
+        <p14:creationId xmlns:p14="http://schemas.microsoft.com/office/powerpoint/2010/main" val="3117705646"/>
+      </p:ext>
+    </p:extLst>
+  </p:cSld>
+  <p:clrMapOvr>
+    <a:masterClrMapping/>
+  </p:clrMapOvr>
+</p:sld>
+</file>
+
 <file path=ppt/theme/theme1.xml><?xml version="1.0" encoding="utf-8"?>
 <a:theme xmlns:a="http://schemas.openxmlformats.org/drawingml/2006/main" name="Office">
   <a:themeElements>

</xml_diff>